<commit_message>
update slides with the new outputs
</commit_message>
<xml_diff>
--- a/Presentation/Presentation17.pptx
+++ b/Presentation/Presentation17.pptx
@@ -5,10 +5,10 @@
     <p:sldMasterId id="2147483648" r:id="rId4"/>
   </p:sldMasterIdLst>
   <p:notesMasterIdLst>
-    <p:notesMasterId r:id="rId34"/>
+    <p:notesMasterId r:id="rId35"/>
   </p:notesMasterIdLst>
   <p:handoutMasterIdLst>
-    <p:handoutMasterId r:id="rId35"/>
+    <p:handoutMasterId r:id="rId36"/>
   </p:handoutMasterIdLst>
   <p:sldIdLst>
     <p:sldId id="324" r:id="rId5"/>
@@ -16,7 +16,7 @@
     <p:sldId id="348" r:id="rId7"/>
     <p:sldId id="350" r:id="rId8"/>
     <p:sldId id="351" r:id="rId9"/>
-    <p:sldId id="352" r:id="rId10"/>
+    <p:sldId id="358" r:id="rId10"/>
     <p:sldId id="302" r:id="rId11"/>
     <p:sldId id="325" r:id="rId12"/>
     <p:sldId id="353" r:id="rId13"/>
@@ -37,9 +37,10 @@
     <p:sldId id="339" r:id="rId28"/>
     <p:sldId id="345" r:id="rId29"/>
     <p:sldId id="357" r:id="rId30"/>
-    <p:sldId id="313" r:id="rId31"/>
-    <p:sldId id="326" r:id="rId32"/>
-    <p:sldId id="304" r:id="rId33"/>
+    <p:sldId id="359" r:id="rId31"/>
+    <p:sldId id="313" r:id="rId32"/>
+    <p:sldId id="326" r:id="rId33"/>
+    <p:sldId id="304" r:id="rId34"/>
   </p:sldIdLst>
   <p:sldSz cx="12192000" cy="6858000"/>
   <p:notesSz cx="6858000" cy="9144000"/>
@@ -271,7 +272,7 @@
             <a:pPr rtl="0"/>
             <a:fld id="{0491AB1A-C669-4C56-AA7A-D7DE065A4843}" type="datetime1">
               <a:rPr lang="en-GB" smtClean="0"/>
-              <a:t>20/09/2022</a:t>
+              <a:t>22/09/2022</a:t>
             </a:fld>
             <a:endParaRPr lang="en-GB" dirty="0"/>
           </a:p>
@@ -452,7 +453,7 @@
             <a:fld id="{035046ED-6F38-493D-8BA0-9E754A816323}" type="datetime1">
               <a:rPr lang="en-GB" smtClean="0"/>
               <a:pPr/>
-              <a:t>20/09/2022</a:t>
+              <a:t>22/09/2022</a:t>
             </a:fld>
             <a:endParaRPr lang="en-GB" dirty="0"/>
           </a:p>
@@ -883,6 +884,91 @@
     </p:spTree>
     <p:extLst>
       <p:ext uri="{BB962C8B-B14F-4D97-AF65-F5344CB8AC3E}">
+        <p14:creationId xmlns:p14="http://schemas.microsoft.com/office/powerpoint/2010/main" val="3796332828"/>
+      </p:ext>
+    </p:extLst>
+  </p:cSld>
+  <p:clrMapOvr>
+    <a:masterClrMapping/>
+  </p:clrMapOvr>
+</p:notes>
+</file>
+
+<file path=ppt/notesSlides/notesSlide11.xml><?xml version="1.0" encoding="utf-8"?>
+<p:notes xmlns:a="http://schemas.openxmlformats.org/drawingml/2006/main" xmlns:r="http://schemas.openxmlformats.org/officeDocument/2006/relationships" xmlns:p="http://schemas.openxmlformats.org/presentationml/2006/main">
+  <p:cSld>
+    <p:spTree>
+      <p:nvGrpSpPr>
+        <p:cNvPr id="1" name=""/>
+        <p:cNvGrpSpPr/>
+        <p:nvPr/>
+      </p:nvGrpSpPr>
+      <p:grpSpPr>
+        <a:xfrm>
+          <a:off x="0" y="0"/>
+          <a:ext cx="0" cy="0"/>
+          <a:chOff x="0" y="0"/>
+          <a:chExt cx="0" cy="0"/>
+        </a:xfrm>
+      </p:grpSpPr>
+      <p:sp>
+        <p:nvSpPr>
+          <p:cNvPr id="2" name="Slide Image Placeholder 1"/>
+          <p:cNvSpPr>
+            <a:spLocks noGrp="1" noRot="1" noChangeAspect="1"/>
+          </p:cNvSpPr>
+          <p:nvPr>
+            <p:ph type="sldImg"/>
+          </p:nvPr>
+        </p:nvSpPr>
+        <p:spPr/>
+      </p:sp>
+      <p:sp>
+        <p:nvSpPr>
+          <p:cNvPr id="3" name="Notes Placeholder 2"/>
+          <p:cNvSpPr>
+            <a:spLocks noGrp="1"/>
+          </p:cNvSpPr>
+          <p:nvPr>
+            <p:ph type="body" idx="1"/>
+          </p:nvPr>
+        </p:nvSpPr>
+        <p:spPr/>
+        <p:txBody>
+          <a:bodyPr/>
+          <a:lstStyle/>
+          <a:p>
+            <a:endParaRPr kumimoji="1" lang="en-GB" altLang="ja-JP"/>
+          </a:p>
+        </p:txBody>
+      </p:sp>
+      <p:sp>
+        <p:nvSpPr>
+          <p:cNvPr id="4" name="Slide Number Placeholder 3"/>
+          <p:cNvSpPr>
+            <a:spLocks noGrp="1"/>
+          </p:cNvSpPr>
+          <p:nvPr>
+            <p:ph type="sldNum" sz="quarter" idx="5"/>
+          </p:nvPr>
+        </p:nvSpPr>
+        <p:spPr/>
+        <p:txBody>
+          <a:bodyPr/>
+          <a:lstStyle/>
+          <a:p>
+            <a:pPr rtl="0"/>
+            <a:fld id="{8530193B-564F-4854-8A52-728F3FB19C85}" type="slidenum">
+              <a:rPr lang="en-GB" smtClean="0"/>
+              <a:t>30</a:t>
+            </a:fld>
+            <a:endParaRPr lang="en-GB"/>
+          </a:p>
+        </p:txBody>
+      </p:sp>
+    </p:spTree>
+    <p:extLst>
+      <p:ext uri="{BB962C8B-B14F-4D97-AF65-F5344CB8AC3E}">
         <p14:creationId xmlns:p14="http://schemas.microsoft.com/office/powerpoint/2010/main" val="1129257347"/>
       </p:ext>
     </p:extLst>
@@ -1479,7 +1565,7 @@
     </p:spTree>
     <p:extLst>
       <p:ext uri="{BB962C8B-B14F-4D97-AF65-F5344CB8AC3E}">
-        <p14:creationId xmlns:p14="http://schemas.microsoft.com/office/powerpoint/2010/main" val="4267604471"/>
+        <p14:creationId xmlns:p14="http://schemas.microsoft.com/office/powerpoint/2010/main" val="3078503619"/>
       </p:ext>
     </p:extLst>
   </p:cSld>
@@ -1564,7 +1650,7 @@
     </p:spTree>
     <p:extLst>
       <p:ext uri="{BB962C8B-B14F-4D97-AF65-F5344CB8AC3E}">
-        <p14:creationId xmlns:p14="http://schemas.microsoft.com/office/powerpoint/2010/main" val="3796332828"/>
+        <p14:creationId xmlns:p14="http://schemas.microsoft.com/office/powerpoint/2010/main" val="4267604471"/>
       </p:ext>
     </p:extLst>
   </p:cSld>
@@ -9674,10 +9760,10 @@
               <a:rPr lang="en-AU" dirty="0"/>
             </a:br>
             <a:r>
-              <a:rPr lang="en-AU" dirty="0"/>
+              <a:rPr lang="en-AU" sz="6600" dirty="0"/>
               <a:t>DATA  Analysis </a:t>
             </a:r>
-            <a:endParaRPr lang="en-GB" dirty="0"/>
+            <a:endParaRPr lang="en-GB" sz="6600" dirty="0"/>
           </a:p>
         </p:txBody>
       </p:sp>
@@ -10685,7 +10771,7 @@
         </p:nvSpPr>
         <p:spPr>
           <a:xfrm>
-            <a:off x="660400" y="2044700"/>
+            <a:off x="660400" y="1789867"/>
             <a:ext cx="4091482" cy="3560763"/>
           </a:xfrm>
         </p:spPr>
@@ -10693,14 +10779,26 @@
           <a:bodyPr rtlCol="0"/>
           <a:lstStyle/>
           <a:p>
+            <a:pPr marL="0" indent="0">
+              <a:buNone/>
+            </a:pPr>
             <a:r>
-              <a:rPr lang="en-AU" dirty="0">
+              <a:rPr lang="en-AU" sz="2400" dirty="0">
                 <a:solidFill>
                   <a:srgbClr val="363635"/>
                 </a:solidFill>
                 <a:latin typeface="opensans"/>
               </a:rPr>
-              <a:t>Our group was interested in investigating relationship between Geolocation access to education as well as the effect Private and Public education has on academic success.</a:t>
+              <a:t>Our group was interested in investigating relationship between Geolocation access to education as well as the effect of Private and Public education has on academic success</a:t>
+            </a:r>
+            <a:r>
+              <a:rPr lang="en-AU" sz="2800" dirty="0">
+                <a:solidFill>
+                  <a:srgbClr val="363635"/>
+                </a:solidFill>
+                <a:latin typeface="opensans"/>
+              </a:rPr>
+              <a:t>.</a:t>
             </a:r>
           </a:p>
           <a:p>
@@ -10719,32 +10817,74 @@
       </p:sp>
       <p:pic>
         <p:nvPicPr>
-          <p:cNvPr id="4" name="Picture Placeholder 3" descr="close up of building">
-            <a:extLst>
-              <a:ext uri="{FF2B5EF4-FFF2-40B4-BE49-F238E27FC236}">
-                <a16:creationId xmlns:a16="http://schemas.microsoft.com/office/drawing/2014/main" id="{5EAB7860-C105-46A8-8B51-C886DCFAB528}"/>
+          <p:cNvPr id="9" name="Picture 8" descr="Icon&#10;&#10;Description automatically generated">
+            <a:extLst>
+              <a:ext uri="{FF2B5EF4-FFF2-40B4-BE49-F238E27FC236}">
+                <a16:creationId xmlns:a16="http://schemas.microsoft.com/office/drawing/2014/main" id="{2350CB4F-0EBC-4B67-9DBC-DA7BE06666B3}"/>
               </a:ext>
             </a:extLst>
           </p:cNvPr>
           <p:cNvPicPr>
-            <a:picLocks noGrp="1" noChangeAspect="1"/>
+            <a:picLocks noChangeAspect="1"/>
           </p:cNvPicPr>
-          <p:nvPr>
-            <p:ph type="pic" sz="quarter" idx="13"/>
-          </p:nvPr>
+          <p:nvPr/>
         </p:nvPicPr>
         <p:blipFill>
-          <a:blip r:embed="rId3"/>
-          <a:srcRect l="22544" r="22544"/>
+          <a:blip r:embed="rId3">
+            <a:extLst>
+              <a:ext uri="{837473B0-CC2E-450A-ABE3-18F120FF3D39}">
+                <a1611:picAttrSrcUrl xmlns:a1611="http://schemas.microsoft.com/office/drawing/2016/11/main" r:id="rId4"/>
+              </a:ext>
+            </a:extLst>
+          </a:blip>
           <a:stretch>
             <a:fillRect/>
           </a:stretch>
         </p:blipFill>
         <p:spPr>
           <a:xfrm>
-            <a:off x="7090227" y="816161"/>
-            <a:ext cx="4441372" cy="5393036"/>
-          </a:xfrm>
+            <a:off x="3162925" y="4027967"/>
+            <a:ext cx="2688507" cy="2444861"/>
+          </a:xfrm>
+          <a:prstGeom prst="rect">
+            <a:avLst/>
+          </a:prstGeom>
+        </p:spPr>
+      </p:pic>
+      <p:pic>
+        <p:nvPicPr>
+          <p:cNvPr id="14" name="Picture 13" descr="A picture containing stationary, toy&#10;&#10;Description automatically generated">
+            <a:extLst>
+              <a:ext uri="{FF2B5EF4-FFF2-40B4-BE49-F238E27FC236}">
+                <a16:creationId xmlns:a16="http://schemas.microsoft.com/office/drawing/2014/main" id="{7DBED2EB-D8FD-2ABA-0A37-11150B6E20D5}"/>
+              </a:ext>
+            </a:extLst>
+          </p:cNvPr>
+          <p:cNvPicPr>
+            <a:picLocks noChangeAspect="1"/>
+          </p:cNvPicPr>
+          <p:nvPr/>
+        </p:nvPicPr>
+        <p:blipFill>
+          <a:blip r:embed="rId5">
+            <a:extLst>
+              <a:ext uri="{837473B0-CC2E-450A-ABE3-18F120FF3D39}">
+                <a1611:picAttrSrcUrl xmlns:a1611="http://schemas.microsoft.com/office/drawing/2016/11/main" r:id="rId6"/>
+              </a:ext>
+            </a:extLst>
+          </a:blip>
+          <a:stretch>
+            <a:fillRect/>
+          </a:stretch>
+        </p:blipFill>
+        <p:spPr>
+          <a:xfrm>
+            <a:off x="6035088" y="959369"/>
+            <a:ext cx="5596002" cy="5366479"/>
+          </a:xfrm>
+          <a:prstGeom prst="rect">
+            <a:avLst/>
+          </a:prstGeom>
         </p:spPr>
       </p:pic>
     </p:spTree>
@@ -11658,6 +11798,280 @@
     <p:bg>
       <p:bgPr>
         <a:solidFill>
+          <a:schemeClr val="tx1"/>
+        </a:solidFill>
+        <a:effectLst/>
+      </p:bgPr>
+    </p:bg>
+    <p:spTree>
+      <p:nvGrpSpPr>
+        <p:cNvPr id="1" name=""/>
+        <p:cNvGrpSpPr/>
+        <p:nvPr/>
+      </p:nvGrpSpPr>
+      <p:grpSpPr>
+        <a:xfrm>
+          <a:off x="0" y="0"/>
+          <a:ext cx="0" cy="0"/>
+          <a:chOff x="0" y="0"/>
+          <a:chExt cx="0" cy="0"/>
+        </a:xfrm>
+      </p:grpSpPr>
+      <p:pic>
+        <p:nvPicPr>
+          <p:cNvPr id="11" name="Picture Placeholder 10" descr="Reflection of city at dusk on mirrored building">
+            <a:extLst>
+              <a:ext uri="{FF2B5EF4-FFF2-40B4-BE49-F238E27FC236}">
+                <a16:creationId xmlns:a16="http://schemas.microsoft.com/office/drawing/2014/main" id="{80F641B8-D4CB-4B34-AF57-A526981DEDAF}"/>
+              </a:ext>
+            </a:extLst>
+          </p:cNvPr>
+          <p:cNvPicPr>
+            <a:picLocks noGrp="1" noChangeAspect="1"/>
+          </p:cNvPicPr>
+          <p:nvPr>
+            <p:ph type="pic" sz="quarter" idx="10"/>
+          </p:nvPr>
+        </p:nvPicPr>
+        <p:blipFill>
+          <a:blip r:embed="rId3">
+            <a:alphaModFix amt="80000"/>
+          </a:blip>
+          <a:srcRect t="6692" b="6692"/>
+          <a:stretch/>
+        </p:blipFill>
+        <p:spPr>
+          <a:xfrm>
+            <a:off x="0" y="-29056"/>
+            <a:ext cx="12192000" cy="6858000"/>
+          </a:xfrm>
+        </p:spPr>
+      </p:pic>
+      <p:sp>
+        <p:nvSpPr>
+          <p:cNvPr id="5" name="Title 4">
+            <a:extLst>
+              <a:ext uri="{FF2B5EF4-FFF2-40B4-BE49-F238E27FC236}">
+                <a16:creationId xmlns:a16="http://schemas.microsoft.com/office/drawing/2014/main" id="{C0CA4A65-0235-4CB2-B09E-4E2D8F223034}"/>
+              </a:ext>
+            </a:extLst>
+          </p:cNvPr>
+          <p:cNvSpPr>
+            <a:spLocks noGrp="1"/>
+          </p:cNvSpPr>
+          <p:nvPr>
+            <p:ph type="title"/>
+          </p:nvPr>
+        </p:nvSpPr>
+        <p:spPr>
+          <a:xfrm>
+            <a:off x="3788612" y="1694813"/>
+            <a:ext cx="4601008" cy="3468373"/>
+          </a:xfrm>
+        </p:spPr>
+        <p:txBody>
+          <a:bodyPr rtlCol="0"/>
+          <a:lstStyle/>
+          <a:p>
+            <a:pPr rtl="0">
+              <a:spcBef>
+                <a:spcPts val="0"/>
+              </a:spcBef>
+              <a:spcAft>
+                <a:spcPts val="0"/>
+              </a:spcAft>
+            </a:pPr>
+            <a:r>
+              <a:rPr lang="en-GB" sz="7200" dirty="0"/>
+              <a:t>Conclusion</a:t>
+            </a:r>
+          </a:p>
+        </p:txBody>
+      </p:sp>
+      <p:sp>
+        <p:nvSpPr>
+          <p:cNvPr id="2" name="Oval 1">
+            <a:extLst>
+              <a:ext uri="{FF2B5EF4-FFF2-40B4-BE49-F238E27FC236}">
+                <a16:creationId xmlns:a16="http://schemas.microsoft.com/office/drawing/2014/main" id="{733AD71F-DA66-44DD-B812-447839E534FB}"/>
+              </a:ext>
+              <a:ext uri="{C183D7F6-B498-43B3-948B-1728B52AA6E4}">
+                <adec:decorative xmlns:adec="http://schemas.microsoft.com/office/drawing/2017/decorative" val="1"/>
+              </a:ext>
+            </a:extLst>
+          </p:cNvPr>
+          <p:cNvSpPr/>
+          <p:nvPr/>
+        </p:nvSpPr>
+        <p:spPr>
+          <a:xfrm>
+            <a:off x="8138160" y="5669280"/>
+            <a:ext cx="502920" cy="502920"/>
+          </a:xfrm>
+          <a:prstGeom prst="ellipse">
+            <a:avLst/>
+          </a:prstGeom>
+          <a:solidFill>
+            <a:schemeClr val="accent2"/>
+          </a:solidFill>
+          <a:ln>
+            <a:noFill/>
+          </a:ln>
+        </p:spPr>
+        <p:style>
+          <a:lnRef idx="2">
+            <a:schemeClr val="accent1">
+              <a:shade val="50000"/>
+            </a:schemeClr>
+          </a:lnRef>
+          <a:fillRef idx="1">
+            <a:schemeClr val="accent1"/>
+          </a:fillRef>
+          <a:effectRef idx="0">
+            <a:schemeClr val="accent1"/>
+          </a:effectRef>
+          <a:fontRef idx="minor">
+            <a:schemeClr val="lt1"/>
+          </a:fontRef>
+        </p:style>
+        <p:txBody>
+          <a:bodyPr rtlCol="0" anchor="ctr"/>
+          <a:lstStyle/>
+          <a:p>
+            <a:pPr algn="ctr" rtl="0"/>
+            <a:endParaRPr lang="en-GB"/>
+          </a:p>
+        </p:txBody>
+      </p:sp>
+      <p:sp>
+        <p:nvSpPr>
+          <p:cNvPr id="3" name="Oval 2">
+            <a:extLst>
+              <a:ext uri="{FF2B5EF4-FFF2-40B4-BE49-F238E27FC236}">
+                <a16:creationId xmlns:a16="http://schemas.microsoft.com/office/drawing/2014/main" id="{A7CF27D1-2BD8-40D7-A92B-834F8A4F76F0}"/>
+              </a:ext>
+              <a:ext uri="{C183D7F6-B498-43B3-948B-1728B52AA6E4}">
+                <adec:decorative xmlns:adec="http://schemas.microsoft.com/office/drawing/2017/decorative" val="1"/>
+              </a:ext>
+            </a:extLst>
+          </p:cNvPr>
+          <p:cNvSpPr/>
+          <p:nvPr/>
+        </p:nvSpPr>
+        <p:spPr>
+          <a:xfrm>
+            <a:off x="2915463" y="1295169"/>
+            <a:ext cx="692878" cy="692878"/>
+          </a:xfrm>
+          <a:prstGeom prst="ellipse">
+            <a:avLst/>
+          </a:prstGeom>
+          <a:solidFill>
+            <a:schemeClr val="bg2"/>
+          </a:solidFill>
+          <a:ln>
+            <a:noFill/>
+          </a:ln>
+        </p:spPr>
+        <p:style>
+          <a:lnRef idx="2">
+            <a:schemeClr val="accent1">
+              <a:shade val="50000"/>
+            </a:schemeClr>
+          </a:lnRef>
+          <a:fillRef idx="1">
+            <a:schemeClr val="accent1"/>
+          </a:fillRef>
+          <a:effectRef idx="0">
+            <a:schemeClr val="accent1"/>
+          </a:effectRef>
+          <a:fontRef idx="minor">
+            <a:schemeClr val="lt1"/>
+          </a:fontRef>
+        </p:style>
+        <p:txBody>
+          <a:bodyPr rtlCol="0" anchor="ctr"/>
+          <a:lstStyle/>
+          <a:p>
+            <a:pPr algn="ctr" rtl="0"/>
+            <a:endParaRPr lang="en-GB"/>
+          </a:p>
+        </p:txBody>
+      </p:sp>
+      <p:sp>
+        <p:nvSpPr>
+          <p:cNvPr id="4" name="Oval 3">
+            <a:extLst>
+              <a:ext uri="{FF2B5EF4-FFF2-40B4-BE49-F238E27FC236}">
+                <a16:creationId xmlns:a16="http://schemas.microsoft.com/office/drawing/2014/main" id="{290F2B13-F976-4C2D-883C-E495CDF04ACA}"/>
+              </a:ext>
+              <a:ext uri="{C183D7F6-B498-43B3-948B-1728B52AA6E4}">
+                <adec:decorative xmlns:adec="http://schemas.microsoft.com/office/drawing/2017/decorative" val="1"/>
+              </a:ext>
+            </a:extLst>
+          </p:cNvPr>
+          <p:cNvSpPr/>
+          <p:nvPr/>
+        </p:nvSpPr>
+        <p:spPr>
+          <a:xfrm>
+            <a:off x="3398520" y="904895"/>
+            <a:ext cx="251460" cy="251460"/>
+          </a:xfrm>
+          <a:prstGeom prst="ellipse">
+            <a:avLst/>
+          </a:prstGeom>
+          <a:solidFill>
+            <a:schemeClr val="accent4"/>
+          </a:solidFill>
+          <a:ln>
+            <a:noFill/>
+          </a:ln>
+        </p:spPr>
+        <p:style>
+          <a:lnRef idx="2">
+            <a:schemeClr val="accent1">
+              <a:shade val="50000"/>
+            </a:schemeClr>
+          </a:lnRef>
+          <a:fillRef idx="1">
+            <a:schemeClr val="accent1"/>
+          </a:fillRef>
+          <a:effectRef idx="0">
+            <a:schemeClr val="accent1"/>
+          </a:effectRef>
+          <a:fontRef idx="minor">
+            <a:schemeClr val="lt1"/>
+          </a:fontRef>
+        </p:style>
+        <p:txBody>
+          <a:bodyPr rtlCol="0" anchor="ctr"/>
+          <a:lstStyle/>
+          <a:p>
+            <a:pPr algn="ctr" rtl="0"/>
+            <a:endParaRPr lang="en-GB"/>
+          </a:p>
+        </p:txBody>
+      </p:sp>
+    </p:spTree>
+    <p:extLst>
+      <p:ext uri="{BB962C8B-B14F-4D97-AF65-F5344CB8AC3E}">
+        <p14:creationId xmlns:p14="http://schemas.microsoft.com/office/powerpoint/2010/main" val="3106045812"/>
+      </p:ext>
+    </p:extLst>
+  </p:cSld>
+  <p:clrMapOvr>
+    <a:masterClrMapping/>
+  </p:clrMapOvr>
+</p:sld>
+</file>
+
+<file path=ppt/slides/slide28.xml><?xml version="1.0" encoding="utf-8"?>
+<p:sld xmlns:a="http://schemas.openxmlformats.org/drawingml/2006/main" xmlns:r="http://schemas.openxmlformats.org/officeDocument/2006/relationships" xmlns:p="http://schemas.openxmlformats.org/presentationml/2006/main">
+  <p:cSld>
+    <p:bg>
+      <p:bgPr>
+        <a:solidFill>
           <a:schemeClr val="bg1">
             <a:lumMod val="95000"/>
           </a:schemeClr>
@@ -11735,8 +12149,8 @@
         </p:nvSpPr>
         <p:spPr>
           <a:xfrm>
-            <a:off x="633730" y="2464093"/>
-            <a:ext cx="4870970" cy="3142228"/>
+            <a:off x="323120" y="2082676"/>
+            <a:ext cx="4870970" cy="3569448"/>
           </a:xfrm>
         </p:spPr>
         <p:txBody>
@@ -11745,7 +12159,7 @@
           <a:p>
             <a:pPr rtl="0"/>
             <a:r>
-              <a:rPr lang="en-GB" dirty="0"/>
+              <a:rPr lang="en-GB" sz="3200" dirty="0"/>
               <a:t>After collecting processing and analysing the data we can confirm our hypothesis that in fact students within the Major Cities also receive Non-Gov education do have higher average academic performance.</a:t>
             </a:r>
           </a:p>
@@ -11754,7 +12168,7 @@
               <a:buFont typeface="Arial" panose="020B0604020202020204" pitchFamily="34" charset="0"/>
               <a:buChar char="•"/>
             </a:pPr>
-            <a:endParaRPr lang="en-GB" dirty="0"/>
+            <a:endParaRPr lang="en-GB" sz="3200" dirty="0"/>
           </a:p>
           <a:p>
             <a:pPr rtl="0"/>
@@ -11768,30 +12182,38 @@
       </p:sp>
       <p:pic>
         <p:nvPicPr>
-          <p:cNvPr id="20" name="Picture Placeholder 8" descr="close up of bridge">
-            <a:extLst>
-              <a:ext uri="{FF2B5EF4-FFF2-40B4-BE49-F238E27FC236}">
-                <a16:creationId xmlns:a16="http://schemas.microsoft.com/office/drawing/2014/main" id="{2EC47CED-7A85-4080-9C7C-3921E48924A7}"/>
+          <p:cNvPr id="7" name="Picture 6" descr="A person writing on a piece of paper&#10;&#10;Description automatically generated with medium confidence">
+            <a:extLst>
+              <a:ext uri="{FF2B5EF4-FFF2-40B4-BE49-F238E27FC236}">
+                <a16:creationId xmlns:a16="http://schemas.microsoft.com/office/drawing/2014/main" id="{A0BE8A73-9F81-D22A-9F09-4AE6BDE0816F}"/>
               </a:ext>
             </a:extLst>
           </p:cNvPr>
           <p:cNvPicPr>
-            <a:picLocks noGrp="1" noChangeAspect="1"/>
+            <a:picLocks noChangeAspect="1"/>
           </p:cNvPicPr>
-          <p:nvPr>
-            <p:ph type="pic" sz="quarter" idx="13"/>
-          </p:nvPr>
+          <p:nvPr/>
         </p:nvPicPr>
-        <p:blipFill rotWithShape="1">
-          <a:blip r:embed="rId3"/>
-          <a:srcRect l="17082" r="17082"/>
-          <a:stretch/>
+        <p:blipFill>
+          <a:blip r:embed="rId3">
+            <a:extLst>
+              <a:ext uri="{837473B0-CC2E-450A-ABE3-18F120FF3D39}">
+                <a1611:picAttrSrcUrl xmlns:a1611="http://schemas.microsoft.com/office/drawing/2016/11/main" r:id="rId4"/>
+              </a:ext>
+            </a:extLst>
+          </a:blip>
+          <a:stretch>
+            <a:fillRect/>
+          </a:stretch>
         </p:blipFill>
         <p:spPr>
           <a:xfrm>
-            <a:off x="6427471" y="491490"/>
-            <a:ext cx="5541962" cy="5611813"/>
-          </a:xfrm>
+            <a:off x="5468834" y="824459"/>
+            <a:ext cx="6400046" cy="4667250"/>
+          </a:xfrm>
+          <a:prstGeom prst="rect">
+            <a:avLst/>
+          </a:prstGeom>
         </p:spPr>
       </p:pic>
     </p:spTree>
@@ -11807,7 +12229,7 @@
 </p:sld>
 </file>
 
-<file path=ppt/slides/slide28.xml><?xml version="1.0" encoding="utf-8"?>
+<file path=ppt/slides/slide29.xml><?xml version="1.0" encoding="utf-8"?>
 <p:sld xmlns:a="http://schemas.openxmlformats.org/drawingml/2006/main" xmlns:r="http://schemas.openxmlformats.org/officeDocument/2006/relationships" xmlns:p="http://schemas.openxmlformats.org/presentationml/2006/main">
   <p:cSld>
     <p:bg>
@@ -11879,7 +12301,7 @@
         </p:nvSpPr>
         <p:spPr>
           <a:xfrm>
-            <a:off x="3352800" y="685800"/>
+            <a:off x="3347194" y="685800"/>
             <a:ext cx="5486400" cy="5486400"/>
           </a:xfrm>
           <a:prstGeom prst="ellipse">
@@ -11937,7 +12359,12 @@
             <p:ph type="title"/>
           </p:nvPr>
         </p:nvSpPr>
-        <p:spPr/>
+        <p:spPr>
+          <a:xfrm>
+            <a:off x="4040072" y="1694813"/>
+            <a:ext cx="4007183" cy="3468373"/>
+          </a:xfrm>
+        </p:spPr>
         <p:txBody>
           <a:bodyPr rtlCol="0"/>
           <a:lstStyle/>
@@ -11951,11 +12378,11 @@
               </a:spcAft>
             </a:pPr>
             <a:r>
-              <a:rPr lang="en-GB" dirty="0"/>
+              <a:rPr lang="en-GB" sz="6000" dirty="0"/>
               <a:t>Data Sources:</a:t>
             </a:r>
             <a:br>
-              <a:rPr lang="en-GB" dirty="0"/>
+              <a:rPr lang="en-GB" sz="6000" dirty="0"/>
             </a:br>
             <a:r>
               <a:rPr lang="en-AU" sz="1800" b="0" i="0" u="sng" strike="noStrike" dirty="0">
@@ -12186,237 +12613,10 @@
           </a:p>
         </p:txBody>
       </p:sp>
-      <p:sp>
-        <p:nvSpPr>
-          <p:cNvPr id="8" name="Text Placeholder 7">
-            <a:extLst>
-              <a:ext uri="{FF2B5EF4-FFF2-40B4-BE49-F238E27FC236}">
-                <a16:creationId xmlns:a16="http://schemas.microsoft.com/office/drawing/2014/main" id="{17DE5458-0766-49A5-8982-EF9557A6BB94}"/>
-              </a:ext>
-            </a:extLst>
-          </p:cNvPr>
-          <p:cNvSpPr>
-            <a:spLocks noGrp="1"/>
-          </p:cNvSpPr>
-          <p:nvPr>
-            <p:ph type="body" sz="quarter" idx="11"/>
-          </p:nvPr>
-        </p:nvSpPr>
-        <p:spPr/>
-        <p:txBody>
-          <a:bodyPr rtlCol="0"/>
-          <a:lstStyle/>
-          <a:p>
-            <a:pPr rtl="0"/>
-            <a:endParaRPr lang="en-GB" dirty="0"/>
-          </a:p>
-        </p:txBody>
-      </p:sp>
     </p:spTree>
     <p:extLst>
       <p:ext uri="{BB962C8B-B14F-4D97-AF65-F5344CB8AC3E}">
         <p14:creationId xmlns:p14="http://schemas.microsoft.com/office/powerpoint/2010/main" val="4101399790"/>
-      </p:ext>
-    </p:extLst>
-  </p:cSld>
-  <p:clrMapOvr>
-    <a:masterClrMapping/>
-  </p:clrMapOvr>
-</p:sld>
-</file>
-
-<file path=ppt/slides/slide29.xml><?xml version="1.0" encoding="utf-8"?>
-<p:sld xmlns:a="http://schemas.openxmlformats.org/drawingml/2006/main" xmlns:r="http://schemas.openxmlformats.org/officeDocument/2006/relationships" xmlns:p="http://schemas.openxmlformats.org/presentationml/2006/main">
-  <p:cSld>
-    <p:spTree>
-      <p:nvGrpSpPr>
-        <p:cNvPr id="1" name=""/>
-        <p:cNvGrpSpPr/>
-        <p:nvPr/>
-      </p:nvGrpSpPr>
-      <p:grpSpPr>
-        <a:xfrm>
-          <a:off x="0" y="0"/>
-          <a:ext cx="0" cy="0"/>
-          <a:chOff x="0" y="0"/>
-          <a:chExt cx="0" cy="0"/>
-        </a:xfrm>
-      </p:grpSpPr>
-      <p:sp>
-        <p:nvSpPr>
-          <p:cNvPr id="3" name="Title 1">
-            <a:extLst>
-              <a:ext uri="{FF2B5EF4-FFF2-40B4-BE49-F238E27FC236}">
-                <a16:creationId xmlns:a16="http://schemas.microsoft.com/office/drawing/2014/main" id="{D88C20CF-C1EE-4092-B52D-FD4AB2AB2508}"/>
-              </a:ext>
-            </a:extLst>
-          </p:cNvPr>
-          <p:cNvSpPr>
-            <a:spLocks noGrp="1"/>
-          </p:cNvSpPr>
-          <p:nvPr>
-            <p:ph type="title"/>
-          </p:nvPr>
-        </p:nvSpPr>
-        <p:spPr>
-          <a:xfrm>
-            <a:off x="207148" y="2335182"/>
-            <a:ext cx="11340000" cy="700114"/>
-          </a:xfrm>
-          <a:prstGeom prst="rect">
-            <a:avLst/>
-          </a:prstGeom>
-        </p:spPr>
-        <p:txBody>
-          <a:bodyPr rtlCol="0" anchor="ctr"/>
-          <a:lstStyle/>
-          <a:p>
-            <a:pPr algn="ctr" rtl="0"/>
-            <a:r>
-              <a:rPr lang="en-GB" sz="4800" b="1" dirty="0">
-                <a:solidFill>
-                  <a:schemeClr val="tx1"/>
-                </a:solidFill>
-              </a:rPr>
-              <a:t>Group 6</a:t>
-            </a:r>
-          </a:p>
-        </p:txBody>
-      </p:sp>
-      <p:sp>
-        <p:nvSpPr>
-          <p:cNvPr id="29" name="Text Placeholder 28">
-            <a:extLst>
-              <a:ext uri="{FF2B5EF4-FFF2-40B4-BE49-F238E27FC236}">
-                <a16:creationId xmlns:a16="http://schemas.microsoft.com/office/drawing/2014/main" id="{E83F2E96-9C2D-4D1E-96F8-93A9DB1304A0}"/>
-              </a:ext>
-            </a:extLst>
-          </p:cNvPr>
-          <p:cNvSpPr>
-            <a:spLocks noGrp="1"/>
-          </p:cNvSpPr>
-          <p:nvPr>
-            <p:ph type="body" sz="quarter" idx="12"/>
-          </p:nvPr>
-        </p:nvSpPr>
-        <p:spPr/>
-        <p:txBody>
-          <a:bodyPr rtlCol="0"/>
-          <a:lstStyle/>
-          <a:p>
-            <a:pPr rtl="0"/>
-            <a:r>
-              <a:rPr lang="en-GB" dirty="0" err="1"/>
-              <a:t>Peregrin</a:t>
-            </a:r>
-            <a:r>
-              <a:rPr lang="en-GB" dirty="0"/>
-              <a:t> Ryan</a:t>
-            </a:r>
-          </a:p>
-        </p:txBody>
-      </p:sp>
-      <p:sp>
-        <p:nvSpPr>
-          <p:cNvPr id="33" name="Text Placeholder 32">
-            <a:extLst>
-              <a:ext uri="{FF2B5EF4-FFF2-40B4-BE49-F238E27FC236}">
-                <a16:creationId xmlns:a16="http://schemas.microsoft.com/office/drawing/2014/main" id="{2F15E5CC-C708-41FE-A7A3-053E1BC87F4F}"/>
-              </a:ext>
-            </a:extLst>
-          </p:cNvPr>
-          <p:cNvSpPr>
-            <a:spLocks noGrp="1"/>
-          </p:cNvSpPr>
-          <p:nvPr>
-            <p:ph type="body" sz="quarter" idx="14"/>
-          </p:nvPr>
-        </p:nvSpPr>
-        <p:spPr/>
-        <p:txBody>
-          <a:bodyPr rtlCol="0"/>
-          <a:lstStyle/>
-          <a:p>
-            <a:pPr rtl="0"/>
-            <a:r>
-              <a:rPr lang="en-GB" dirty="0"/>
-              <a:t>Josh Martin</a:t>
-            </a:r>
-          </a:p>
-        </p:txBody>
-      </p:sp>
-      <p:sp>
-        <p:nvSpPr>
-          <p:cNvPr id="36" name="Text Placeholder 35">
-            <a:extLst>
-              <a:ext uri="{FF2B5EF4-FFF2-40B4-BE49-F238E27FC236}">
-                <a16:creationId xmlns:a16="http://schemas.microsoft.com/office/drawing/2014/main" id="{600F09FF-0051-4C2F-8747-35EDBE996D02}"/>
-              </a:ext>
-            </a:extLst>
-          </p:cNvPr>
-          <p:cNvSpPr>
-            <a:spLocks noGrp="1"/>
-          </p:cNvSpPr>
-          <p:nvPr>
-            <p:ph type="body" sz="quarter" idx="16"/>
-          </p:nvPr>
-        </p:nvSpPr>
-        <p:spPr/>
-        <p:txBody>
-          <a:bodyPr rtlCol="0"/>
-          <a:lstStyle/>
-          <a:p>
-            <a:pPr rtl="0"/>
-            <a:r>
-              <a:rPr lang="en-GB" dirty="0" err="1"/>
-              <a:t>Udeshi</a:t>
-            </a:r>
-            <a:r>
-              <a:rPr lang="en-GB" dirty="0"/>
-              <a:t> Pereira</a:t>
-            </a:r>
-          </a:p>
-        </p:txBody>
-      </p:sp>
-      <p:sp>
-        <p:nvSpPr>
-          <p:cNvPr id="2" name="TextBox 1">
-            <a:extLst>
-              <a:ext uri="{FF2B5EF4-FFF2-40B4-BE49-F238E27FC236}">
-                <a16:creationId xmlns:a16="http://schemas.microsoft.com/office/drawing/2014/main" id="{AB55B94D-FB01-DC23-88CA-3134D76B103E}"/>
-              </a:ext>
-            </a:extLst>
-          </p:cNvPr>
-          <p:cNvSpPr txBox="1"/>
-          <p:nvPr/>
-        </p:nvSpPr>
-        <p:spPr>
-          <a:xfrm>
-            <a:off x="4227225" y="1289154"/>
-            <a:ext cx="3402767" cy="369332"/>
-          </a:xfrm>
-          <a:prstGeom prst="rect">
-            <a:avLst/>
-          </a:prstGeom>
-          <a:noFill/>
-        </p:spPr>
-        <p:txBody>
-          <a:bodyPr wrap="square" rtlCol="0">
-            <a:spAutoFit/>
-          </a:bodyPr>
-          <a:lstStyle/>
-          <a:p>
-            <a:r>
-              <a:rPr lang="en-US" dirty="0"/>
-              <a:t>Thanks for watching</a:t>
-            </a:r>
-          </a:p>
-        </p:txBody>
-      </p:sp>
-    </p:spTree>
-    <p:extLst>
-      <p:ext uri="{BB962C8B-B14F-4D97-AF65-F5344CB8AC3E}">
-        <p14:creationId xmlns:p14="http://schemas.microsoft.com/office/powerpoint/2010/main" val="3401748718"/>
       </p:ext>
     </p:extLst>
   </p:cSld>
@@ -12445,10 +12645,10 @@
       </p:grpSpPr>
       <p:sp>
         <p:nvSpPr>
-          <p:cNvPr id="2" name="Title 1">
-            <a:extLst>
-              <a:ext uri="{FF2B5EF4-FFF2-40B4-BE49-F238E27FC236}">
-                <a16:creationId xmlns:a16="http://schemas.microsoft.com/office/drawing/2014/main" id="{8CD92F63-1AF5-B3D3-A882-BAB0957BAFB2}"/>
+          <p:cNvPr id="19" name="Text Placeholder 1">
+            <a:extLst>
+              <a:ext uri="{FF2B5EF4-FFF2-40B4-BE49-F238E27FC236}">
+                <a16:creationId xmlns:a16="http://schemas.microsoft.com/office/drawing/2014/main" id="{E5DA7451-8D9E-7727-6C2C-17B98C3EF0EF}"/>
               </a:ext>
             </a:extLst>
           </p:cNvPr>
@@ -12456,13 +12656,13 @@
             <a:spLocks noGrp="1"/>
           </p:cNvSpPr>
           <p:nvPr>
-            <p:ph type="title"/>
-          </p:nvPr>
-        </p:nvSpPr>
-        <p:spPr>
-          <a:xfrm>
-            <a:off x="432000" y="647700"/>
-            <a:ext cx="7100370" cy="3581400"/>
+            <p:ph type="body" sz="quarter" idx="11"/>
+          </p:nvPr>
+        </p:nvSpPr>
+        <p:spPr>
+          <a:xfrm>
+            <a:off x="6312871" y="1189055"/>
+            <a:ext cx="4220845" cy="861497"/>
           </a:xfrm>
         </p:spPr>
         <p:txBody>
@@ -12470,43 +12670,548 @@
           <a:lstStyle/>
           <a:p>
             <a:r>
-              <a:rPr lang="en-US" dirty="0"/>
+              <a:rPr lang="en-US" sz="4800" dirty="0"/>
               <a:t>Hypothesis:</a:t>
             </a:r>
+          </a:p>
+        </p:txBody>
+      </p:sp>
+      <p:pic>
+        <p:nvPicPr>
+          <p:cNvPr id="13" name="Picture 12" descr="Text&#10;&#10;Description automatically generated with medium confidence">
+            <a:extLst>
+              <a:ext uri="{FF2B5EF4-FFF2-40B4-BE49-F238E27FC236}">
+                <a16:creationId xmlns:a16="http://schemas.microsoft.com/office/drawing/2014/main" id="{57CEDFEC-5C9E-E529-65DC-083057D63417}"/>
+              </a:ext>
+            </a:extLst>
+          </p:cNvPr>
+          <p:cNvPicPr>
+            <a:picLocks noChangeAspect="1"/>
+          </p:cNvPicPr>
+          <p:nvPr/>
+        </p:nvPicPr>
+        <p:blipFill rotWithShape="1">
+          <a:blip r:embed="rId2">
+            <a:extLst>
+              <a:ext uri="{837473B0-CC2E-450A-ABE3-18F120FF3D39}">
+                <a1611:picAttrSrcUrl xmlns:a1611="http://schemas.microsoft.com/office/drawing/2016/11/main" r:id="rId3"/>
+              </a:ext>
+            </a:extLst>
+          </a:blip>
+          <a:srcRect l="13909" r="16824" b="2"/>
+          <a:stretch/>
+        </p:blipFill>
+        <p:spPr>
+          <a:xfrm>
+            <a:off x="1571515" y="1914044"/>
+            <a:ext cx="3993624" cy="3617848"/>
+          </a:xfrm>
+          <a:custGeom>
+            <a:avLst/>
+            <a:gdLst>
+              <a:gd name="connsiteX0" fmla="*/ 1223161 w 3993624"/>
+              <a:gd name="connsiteY0" fmla="*/ 2354088 h 3617848"/>
+              <a:gd name="connsiteX1" fmla="*/ 2057242 w 3993624"/>
+              <a:gd name="connsiteY1" fmla="*/ 2354088 h 3617848"/>
+              <a:gd name="connsiteX2" fmla="*/ 2373182 w 3993624"/>
+              <a:gd name="connsiteY2" fmla="*/ 2985968 h 3617848"/>
+              <a:gd name="connsiteX3" fmla="*/ 2057242 w 3993624"/>
+              <a:gd name="connsiteY3" fmla="*/ 3617848 h 3617848"/>
+              <a:gd name="connsiteX4" fmla="*/ 1223161 w 3993624"/>
+              <a:gd name="connsiteY4" fmla="*/ 3617848 h 3617848"/>
+              <a:gd name="connsiteX5" fmla="*/ 907221 w 3993624"/>
+              <a:gd name="connsiteY5" fmla="*/ 2985968 h 3617848"/>
+              <a:gd name="connsiteX6" fmla="*/ 2569631 w 3993624"/>
+              <a:gd name="connsiteY6" fmla="*/ 1425984 h 3617848"/>
+              <a:gd name="connsiteX7" fmla="*/ 3602417 w 3993624"/>
+              <a:gd name="connsiteY7" fmla="*/ 1425984 h 3617848"/>
+              <a:gd name="connsiteX8" fmla="*/ 3993624 w 3993624"/>
+              <a:gd name="connsiteY8" fmla="*/ 2208398 h 3617848"/>
+              <a:gd name="connsiteX9" fmla="*/ 3602417 w 3993624"/>
+              <a:gd name="connsiteY9" fmla="*/ 2990812 h 3617848"/>
+              <a:gd name="connsiteX10" fmla="*/ 2569631 w 3993624"/>
+              <a:gd name="connsiteY10" fmla="*/ 2990812 h 3617848"/>
+              <a:gd name="connsiteX11" fmla="*/ 2178424 w 3993624"/>
+              <a:gd name="connsiteY11" fmla="*/ 2208398 h 3617848"/>
+              <a:gd name="connsiteX12" fmla="*/ 551406 w 3993624"/>
+              <a:gd name="connsiteY12" fmla="*/ 0 h 3617848"/>
+              <a:gd name="connsiteX13" fmla="*/ 2007117 w 3993624"/>
+              <a:gd name="connsiteY13" fmla="*/ 0 h 3617848"/>
+              <a:gd name="connsiteX14" fmla="*/ 2558523 w 3993624"/>
+              <a:gd name="connsiteY14" fmla="*/ 1102811 h 3617848"/>
+              <a:gd name="connsiteX15" fmla="*/ 2007117 w 3993624"/>
+              <a:gd name="connsiteY15" fmla="*/ 2205622 h 3617848"/>
+              <a:gd name="connsiteX16" fmla="*/ 551406 w 3993624"/>
+              <a:gd name="connsiteY16" fmla="*/ 2205622 h 3617848"/>
+              <a:gd name="connsiteX17" fmla="*/ 0 w 3993624"/>
+              <a:gd name="connsiteY17" fmla="*/ 1102811 h 3617848"/>
+            </a:gdLst>
+            <a:ahLst/>
+            <a:cxnLst>
+              <a:cxn ang="0">
+                <a:pos x="connsiteX0" y="connsiteY0"/>
+              </a:cxn>
+              <a:cxn ang="0">
+                <a:pos x="connsiteX1" y="connsiteY1"/>
+              </a:cxn>
+              <a:cxn ang="0">
+                <a:pos x="connsiteX2" y="connsiteY2"/>
+              </a:cxn>
+              <a:cxn ang="0">
+                <a:pos x="connsiteX3" y="connsiteY3"/>
+              </a:cxn>
+              <a:cxn ang="0">
+                <a:pos x="connsiteX4" y="connsiteY4"/>
+              </a:cxn>
+              <a:cxn ang="0">
+                <a:pos x="connsiteX5" y="connsiteY5"/>
+              </a:cxn>
+              <a:cxn ang="0">
+                <a:pos x="connsiteX6" y="connsiteY6"/>
+              </a:cxn>
+              <a:cxn ang="0">
+                <a:pos x="connsiteX7" y="connsiteY7"/>
+              </a:cxn>
+              <a:cxn ang="0">
+                <a:pos x="connsiteX8" y="connsiteY8"/>
+              </a:cxn>
+              <a:cxn ang="0">
+                <a:pos x="connsiteX9" y="connsiteY9"/>
+              </a:cxn>
+              <a:cxn ang="0">
+                <a:pos x="connsiteX10" y="connsiteY10"/>
+              </a:cxn>
+              <a:cxn ang="0">
+                <a:pos x="connsiteX11" y="connsiteY11"/>
+              </a:cxn>
+              <a:cxn ang="0">
+                <a:pos x="connsiteX12" y="connsiteY12"/>
+              </a:cxn>
+              <a:cxn ang="0">
+                <a:pos x="connsiteX13" y="connsiteY13"/>
+              </a:cxn>
+              <a:cxn ang="0">
+                <a:pos x="connsiteX14" y="connsiteY14"/>
+              </a:cxn>
+              <a:cxn ang="0">
+                <a:pos x="connsiteX15" y="connsiteY15"/>
+              </a:cxn>
+              <a:cxn ang="0">
+                <a:pos x="connsiteX16" y="connsiteY16"/>
+              </a:cxn>
+              <a:cxn ang="0">
+                <a:pos x="connsiteX17" y="connsiteY17"/>
+              </a:cxn>
+            </a:cxnLst>
+            <a:rect l="l" t="t" r="r" b="b"/>
+            <a:pathLst>
+              <a:path w="3993624" h="3617848">
+                <a:moveTo>
+                  <a:pt x="1223161" y="2354088"/>
+                </a:moveTo>
+                <a:lnTo>
+                  <a:pt x="2057242" y="2354088"/>
+                </a:lnTo>
+                <a:lnTo>
+                  <a:pt x="2373182" y="2985968"/>
+                </a:lnTo>
+                <a:lnTo>
+                  <a:pt x="2057242" y="3617848"/>
+                </a:lnTo>
+                <a:lnTo>
+                  <a:pt x="1223161" y="3617848"/>
+                </a:lnTo>
+                <a:lnTo>
+                  <a:pt x="907221" y="2985968"/>
+                </a:lnTo>
+                <a:close/>
+                <a:moveTo>
+                  <a:pt x="2569631" y="1425984"/>
+                </a:moveTo>
+                <a:lnTo>
+                  <a:pt x="3602417" y="1425984"/>
+                </a:lnTo>
+                <a:lnTo>
+                  <a:pt x="3993624" y="2208398"/>
+                </a:lnTo>
+                <a:lnTo>
+                  <a:pt x="3602417" y="2990812"/>
+                </a:lnTo>
+                <a:lnTo>
+                  <a:pt x="2569631" y="2990812"/>
+                </a:lnTo>
+                <a:lnTo>
+                  <a:pt x="2178424" y="2208398"/>
+                </a:lnTo>
+                <a:close/>
+                <a:moveTo>
+                  <a:pt x="551406" y="0"/>
+                </a:moveTo>
+                <a:lnTo>
+                  <a:pt x="2007117" y="0"/>
+                </a:lnTo>
+                <a:lnTo>
+                  <a:pt x="2558523" y="1102811"/>
+                </a:lnTo>
+                <a:lnTo>
+                  <a:pt x="2007117" y="2205622"/>
+                </a:lnTo>
+                <a:lnTo>
+                  <a:pt x="551406" y="2205622"/>
+                </a:lnTo>
+                <a:lnTo>
+                  <a:pt x="0" y="1102811"/>
+                </a:lnTo>
+                <a:close/>
+              </a:path>
+            </a:pathLst>
+          </a:custGeom>
+          <a:noFill/>
+        </p:spPr>
+      </p:pic>
+      <p:sp>
+        <p:nvSpPr>
+          <p:cNvPr id="2" name="Title 1">
+            <a:extLst>
+              <a:ext uri="{FF2B5EF4-FFF2-40B4-BE49-F238E27FC236}">
+                <a16:creationId xmlns:a16="http://schemas.microsoft.com/office/drawing/2014/main" id="{8CD92F63-1AF5-B3D3-A882-BAB0957BAFB2}"/>
+              </a:ext>
+            </a:extLst>
+          </p:cNvPr>
+          <p:cNvSpPr>
+            <a:spLocks noGrp="1"/>
+          </p:cNvSpPr>
+          <p:nvPr>
+            <p:ph type="title"/>
+          </p:nvPr>
+        </p:nvSpPr>
+        <p:spPr>
+          <a:xfrm>
+            <a:off x="6312871" y="2203554"/>
+            <a:ext cx="4998720" cy="2603895"/>
+          </a:xfrm>
+        </p:spPr>
+        <p:txBody>
+          <a:bodyPr>
+            <a:normAutofit fontScale="90000"/>
+          </a:bodyPr>
+          <a:lstStyle/>
+          <a:p>
             <a:br>
-              <a:rPr lang="en-US" dirty="0"/>
+              <a:rPr lang="en-US" sz="1800" dirty="0"/>
+            </a:br>
+            <a:br>
+              <a:rPr lang="en-US" sz="1800" dirty="0"/>
             </a:br>
             <a:r>
-              <a:rPr lang="en-US" i="1" dirty="0">
+              <a:rPr lang="en-US" sz="2700" i="1" dirty="0"/>
+              <a:t>If students within Major Cities such as Melbourne or Geelong, that also receive Private, Non-Gov education then we expect them to have best chance of academic success within Victoria</a:t>
+            </a:r>
+          </a:p>
+        </p:txBody>
+      </p:sp>
+      <p:sp>
+        <p:nvSpPr>
+          <p:cNvPr id="14" name="TextBox 13">
+            <a:extLst>
+              <a:ext uri="{FF2B5EF4-FFF2-40B4-BE49-F238E27FC236}">
+                <a16:creationId xmlns:a16="http://schemas.microsoft.com/office/drawing/2014/main" id="{C3F9B9AC-FC94-CF7E-270B-F0D90E9AB102}"/>
+              </a:ext>
+            </a:extLst>
+          </p:cNvPr>
+          <p:cNvSpPr txBox="1"/>
+          <p:nvPr/>
+        </p:nvSpPr>
+        <p:spPr>
+          <a:xfrm>
+            <a:off x="9896180" y="6657945"/>
+            <a:ext cx="2295820" cy="200055"/>
+          </a:xfrm>
+          <a:prstGeom prst="rect">
+            <a:avLst/>
+          </a:prstGeom>
+          <a:solidFill>
+            <a:srgbClr val="000000"/>
+          </a:solidFill>
+        </p:spPr>
+        <p:txBody>
+          <a:bodyPr wrap="none" rtlCol="0">
+            <a:spAutoFit/>
+          </a:bodyPr>
+          <a:lstStyle/>
+          <a:p>
+            <a:pPr algn="r">
+              <a:spcAft>
+                <a:spcPts val="600"/>
+              </a:spcAft>
+            </a:pPr>
+            <a:r>
+              <a:rPr lang="en-US" sz="700">
+                <a:solidFill>
+                  <a:srgbClr val="FFFFFF"/>
+                </a:solidFill>
+                <a:hlinkClick r:id="rId3" tooltip="http://www.flickr.com/photos/7815007@N07/8302898204/">
+                  <a:extLst>
+                    <a:ext uri="{A12FA001-AC4F-418D-AE19-62706E023703}">
+                      <ahyp:hlinkClr xmlns:ahyp="http://schemas.microsoft.com/office/drawing/2018/hyperlinkcolor" val="tx"/>
+                    </a:ext>
+                  </a:extLst>
+                </a:hlinkClick>
+              </a:rPr>
+              <a:t>This Photo</a:t>
+            </a:r>
+            <a:r>
+              <a:rPr lang="en-US" sz="700">
+                <a:solidFill>
+                  <a:srgbClr val="FFFFFF"/>
+                </a:solidFill>
+              </a:rPr>
+              <a:t> by Unknown Author is licensed under </a:t>
+            </a:r>
+            <a:r>
+              <a:rPr lang="en-US" sz="700">
+                <a:solidFill>
+                  <a:srgbClr val="FFFFFF"/>
+                </a:solidFill>
+                <a:hlinkClick r:id="rId4" tooltip="https://creativecommons.org/licenses/by-nc/3.0/">
+                  <a:extLst>
+                    <a:ext uri="{A12FA001-AC4F-418D-AE19-62706E023703}">
+                      <ahyp:hlinkClr xmlns:ahyp="http://schemas.microsoft.com/office/drawing/2018/hyperlinkcolor" val="tx"/>
+                    </a:ext>
+                  </a:extLst>
+                </a:hlinkClick>
+              </a:rPr>
+              <a:t>CC BY-NC</a:t>
+            </a:r>
+            <a:endParaRPr lang="en-US" sz="700">
+              <a:solidFill>
+                <a:srgbClr val="FFFFFF"/>
+              </a:solidFill>
+            </a:endParaRPr>
+          </a:p>
+        </p:txBody>
+      </p:sp>
+    </p:spTree>
+    <p:extLst>
+      <p:ext uri="{BB962C8B-B14F-4D97-AF65-F5344CB8AC3E}">
+        <p14:creationId xmlns:p14="http://schemas.microsoft.com/office/powerpoint/2010/main" val="253445027"/>
+      </p:ext>
+    </p:extLst>
+  </p:cSld>
+  <p:clrMapOvr>
+    <a:masterClrMapping/>
+  </p:clrMapOvr>
+</p:sld>
+</file>
+
+<file path=ppt/slides/slide30.xml><?xml version="1.0" encoding="utf-8"?>
+<p:sld xmlns:a="http://schemas.openxmlformats.org/drawingml/2006/main" xmlns:r="http://schemas.openxmlformats.org/officeDocument/2006/relationships" xmlns:p="http://schemas.openxmlformats.org/presentationml/2006/main">
+  <p:cSld>
+    <p:spTree>
+      <p:nvGrpSpPr>
+        <p:cNvPr id="1" name=""/>
+        <p:cNvGrpSpPr/>
+        <p:nvPr/>
+      </p:nvGrpSpPr>
+      <p:grpSpPr>
+        <a:xfrm>
+          <a:off x="0" y="0"/>
+          <a:ext cx="0" cy="0"/>
+          <a:chOff x="0" y="0"/>
+          <a:chExt cx="0" cy="0"/>
+        </a:xfrm>
+      </p:grpSpPr>
+      <p:sp>
+        <p:nvSpPr>
+          <p:cNvPr id="3" name="Title 1">
+            <a:extLst>
+              <a:ext uri="{FF2B5EF4-FFF2-40B4-BE49-F238E27FC236}">
+                <a16:creationId xmlns:a16="http://schemas.microsoft.com/office/drawing/2014/main" id="{D88C20CF-C1EE-4092-B52D-FD4AB2AB2508}"/>
+              </a:ext>
+            </a:extLst>
+          </p:cNvPr>
+          <p:cNvSpPr>
+            <a:spLocks noGrp="1"/>
+          </p:cNvSpPr>
+          <p:nvPr>
+            <p:ph type="title"/>
+          </p:nvPr>
+        </p:nvSpPr>
+        <p:spPr>
+          <a:xfrm>
+            <a:off x="7810467" y="706143"/>
+            <a:ext cx="3417166" cy="700114"/>
+          </a:xfrm>
+          <a:prstGeom prst="rect">
+            <a:avLst/>
+          </a:prstGeom>
+        </p:spPr>
+        <p:txBody>
+          <a:bodyPr rtlCol="0" anchor="ctr"/>
+          <a:lstStyle/>
+          <a:p>
+            <a:pPr algn="ctr" rtl="0"/>
+            <a:r>
+              <a:rPr lang="en-GB" sz="4800" b="1" dirty="0">
                 <a:solidFill>
                   <a:schemeClr val="tx1"/>
                 </a:solidFill>
               </a:rPr>
-              <a:t>If </a:t>
+              <a:t>Group 6</a:t>
+            </a:r>
+          </a:p>
+        </p:txBody>
+      </p:sp>
+      <p:sp>
+        <p:nvSpPr>
+          <p:cNvPr id="29" name="Text Placeholder 28">
+            <a:extLst>
+              <a:ext uri="{FF2B5EF4-FFF2-40B4-BE49-F238E27FC236}">
+                <a16:creationId xmlns:a16="http://schemas.microsoft.com/office/drawing/2014/main" id="{E83F2E96-9C2D-4D1E-96F8-93A9DB1304A0}"/>
+              </a:ext>
+            </a:extLst>
+          </p:cNvPr>
+          <p:cNvSpPr>
+            <a:spLocks noGrp="1"/>
+          </p:cNvSpPr>
+          <p:nvPr>
+            <p:ph type="body" sz="quarter" idx="12"/>
+          </p:nvPr>
+        </p:nvSpPr>
+        <p:spPr>
+          <a:xfrm>
+            <a:off x="8384382" y="3355461"/>
+            <a:ext cx="2794160" cy="1011834"/>
+          </a:xfrm>
+        </p:spPr>
+        <p:txBody>
+          <a:bodyPr rtlCol="0"/>
+          <a:lstStyle/>
+          <a:p>
+            <a:pPr rtl="0"/>
+            <a:r>
+              <a:rPr lang="en-GB" sz="3200" dirty="0" err="1"/>
+              <a:t>Peregrin</a:t>
             </a:r>
             <a:r>
-              <a:rPr lang="en-US" i="1" dirty="0"/>
-              <a:t>students within Major Cities such as Melbourne or Geelong, that also receive Private, Non-Gov education </a:t>
+              <a:rPr lang="en-GB" sz="3200" dirty="0"/>
+              <a:t> Ryan</a:t>
+            </a:r>
+          </a:p>
+        </p:txBody>
+      </p:sp>
+      <p:sp>
+        <p:nvSpPr>
+          <p:cNvPr id="33" name="Text Placeholder 32">
+            <a:extLst>
+              <a:ext uri="{FF2B5EF4-FFF2-40B4-BE49-F238E27FC236}">
+                <a16:creationId xmlns:a16="http://schemas.microsoft.com/office/drawing/2014/main" id="{2F15E5CC-C708-41FE-A7A3-053E1BC87F4F}"/>
+              </a:ext>
+            </a:extLst>
+          </p:cNvPr>
+          <p:cNvSpPr>
+            <a:spLocks noGrp="1"/>
+          </p:cNvSpPr>
+          <p:nvPr>
+            <p:ph type="body" sz="quarter" idx="14"/>
+          </p:nvPr>
+        </p:nvSpPr>
+        <p:spPr>
+          <a:xfrm>
+            <a:off x="8275330" y="1984790"/>
+            <a:ext cx="2903212" cy="1011833"/>
+          </a:xfrm>
+        </p:spPr>
+        <p:txBody>
+          <a:bodyPr rtlCol="0"/>
+          <a:lstStyle/>
+          <a:p>
+            <a:pPr rtl="0"/>
+            <a:r>
+              <a:rPr lang="en-GB" sz="3200" dirty="0"/>
+              <a:t>Josh Martin</a:t>
+            </a:r>
+          </a:p>
+        </p:txBody>
+      </p:sp>
+      <p:sp>
+        <p:nvSpPr>
+          <p:cNvPr id="36" name="Text Placeholder 35">
+            <a:extLst>
+              <a:ext uri="{FF2B5EF4-FFF2-40B4-BE49-F238E27FC236}">
+                <a16:creationId xmlns:a16="http://schemas.microsoft.com/office/drawing/2014/main" id="{600F09FF-0051-4C2F-8747-35EDBE996D02}"/>
+              </a:ext>
+            </a:extLst>
+          </p:cNvPr>
+          <p:cNvSpPr>
+            <a:spLocks noGrp="1"/>
+          </p:cNvSpPr>
+          <p:nvPr>
+            <p:ph type="body" sz="quarter" idx="16"/>
+          </p:nvPr>
+        </p:nvSpPr>
+        <p:spPr>
+          <a:xfrm>
+            <a:off x="8534284" y="4789968"/>
+            <a:ext cx="2794160" cy="1011832"/>
+          </a:xfrm>
+        </p:spPr>
+        <p:txBody>
+          <a:bodyPr rtlCol="0"/>
+          <a:lstStyle/>
+          <a:p>
+            <a:pPr rtl="0"/>
+            <a:r>
+              <a:rPr lang="en-GB" sz="3200" dirty="0" err="1"/>
+              <a:t>Udeshi</a:t>
             </a:r>
             <a:r>
-              <a:rPr lang="en-US" i="1" dirty="0">
-                <a:solidFill>
-                  <a:schemeClr val="tx1"/>
-                </a:solidFill>
-              </a:rPr>
-              <a:t>then</a:t>
+              <a:rPr lang="en-GB" sz="3200" dirty="0"/>
+              <a:t> Pereira</a:t>
             </a:r>
-            <a:r>
-              <a:rPr lang="en-US" i="1" dirty="0"/>
-              <a:t> we expect them to have best chance of academic success within Victoria</a:t>
-            </a:r>
-          </a:p>
-        </p:txBody>
-      </p:sp>
+          </a:p>
+        </p:txBody>
+      </p:sp>
+      <p:pic>
+        <p:nvPicPr>
+          <p:cNvPr id="5" name="Picture 4" descr="A green sign with white lettering&#10;&#10;Description automatically generated with low confidence">
+            <a:extLst>
+              <a:ext uri="{FF2B5EF4-FFF2-40B4-BE49-F238E27FC236}">
+                <a16:creationId xmlns:a16="http://schemas.microsoft.com/office/drawing/2014/main" id="{86B3F04E-3B39-61D5-A91E-E52E107412B0}"/>
+              </a:ext>
+            </a:extLst>
+          </p:cNvPr>
+          <p:cNvPicPr>
+            <a:picLocks noChangeAspect="1"/>
+          </p:cNvPicPr>
+          <p:nvPr/>
+        </p:nvPicPr>
+        <p:blipFill>
+          <a:blip r:embed="rId3">
+            <a:extLst>
+              <a:ext uri="{837473B0-CC2E-450A-ABE3-18F120FF3D39}">
+                <a1611:picAttrSrcUrl xmlns:a1611="http://schemas.microsoft.com/office/drawing/2016/11/main" r:id="rId4"/>
+              </a:ext>
+            </a:extLst>
+          </a:blip>
+          <a:stretch>
+            <a:fillRect/>
+          </a:stretch>
+        </p:blipFill>
+        <p:spPr>
+          <a:xfrm>
+            <a:off x="450413" y="625163"/>
+            <a:ext cx="7764956" cy="5176637"/>
+          </a:xfrm>
+          <a:prstGeom prst="rect">
+            <a:avLst/>
+          </a:prstGeom>
+        </p:spPr>
+      </p:pic>
     </p:spTree>
     <p:extLst>
       <p:ext uri="{BB962C8B-B14F-4D97-AF65-F5344CB8AC3E}">
-        <p14:creationId xmlns:p14="http://schemas.microsoft.com/office/powerpoint/2010/main" val="253445027"/>
+        <p14:creationId xmlns:p14="http://schemas.microsoft.com/office/powerpoint/2010/main" val="3401748718"/>
       </p:ext>
     </p:extLst>
   </p:cSld>
@@ -12549,7 +13254,12 @@
             <p:ph type="title"/>
           </p:nvPr>
         </p:nvSpPr>
-        <p:spPr/>
+        <p:spPr>
+          <a:xfrm flipH="1">
+            <a:off x="7066298" y="1342764"/>
+            <a:ext cx="4002379" cy="1229192"/>
+          </a:xfrm>
+        </p:spPr>
         <p:txBody>
           <a:bodyPr/>
           <a:lstStyle/>
@@ -12579,8 +13289,8 @@
         </p:nvSpPr>
         <p:spPr>
           <a:xfrm>
-            <a:off x="1177290" y="1977390"/>
-            <a:ext cx="6909777" cy="369332"/>
+            <a:off x="7905750" y="2948915"/>
+            <a:ext cx="2323476" cy="2308324"/>
           </a:xfrm>
           <a:prstGeom prst="rect">
             <a:avLst/>
@@ -12588,7 +13298,7 @@
           <a:noFill/>
         </p:spPr>
         <p:txBody>
-          <a:bodyPr wrap="none" rtlCol="0">
+          <a:bodyPr wrap="square" rtlCol="0">
             <a:spAutoFit/>
           </a:bodyPr>
           <a:lstStyle/>
@@ -12598,17 +13308,94 @@
               <a:buChar char="•"/>
             </a:pPr>
             <a:r>
-              <a:rPr lang="en-US" dirty="0"/>
-              <a:t>The way we measure academic success was </a:t>
+              <a:rPr lang="en-US" sz="2400" dirty="0"/>
+              <a:t>The way we measure academic success was measuring ATAR Score </a:t>
             </a:r>
-            <a:r>
-              <a:rPr lang="en-US" dirty="0" err="1"/>
-              <a:t>mesurering</a:t>
-            </a:r>
-            <a:r>
-              <a:rPr lang="en-US" dirty="0"/>
-              <a:t> ATAR scores </a:t>
-            </a:r>
+          </a:p>
+        </p:txBody>
+      </p:sp>
+      <p:pic>
+        <p:nvPicPr>
+          <p:cNvPr id="5" name="Picture 4" descr="A close-up of a credit card&#10;&#10;Description automatically generated with medium confidence">
+            <a:extLst>
+              <a:ext uri="{FF2B5EF4-FFF2-40B4-BE49-F238E27FC236}">
+                <a16:creationId xmlns:a16="http://schemas.microsoft.com/office/drawing/2014/main" id="{02B609E6-B088-4C9D-EBE2-30240C3064D2}"/>
+              </a:ext>
+            </a:extLst>
+          </p:cNvPr>
+          <p:cNvPicPr>
+            <a:picLocks noChangeAspect="1"/>
+          </p:cNvPicPr>
+          <p:nvPr/>
+        </p:nvPicPr>
+        <p:blipFill>
+          <a:blip r:embed="rId2">
+            <a:extLst>
+              <a:ext uri="{837473B0-CC2E-450A-ABE3-18F120FF3D39}">
+                <a1611:picAttrSrcUrl xmlns:a1611="http://schemas.microsoft.com/office/drawing/2016/11/main" r:id="rId3"/>
+              </a:ext>
+            </a:extLst>
+          </a:blip>
+          <a:stretch>
+            <a:fillRect/>
+          </a:stretch>
+        </p:blipFill>
+        <p:spPr>
+          <a:xfrm>
+            <a:off x="515726" y="1342765"/>
+            <a:ext cx="5580274" cy="4650230"/>
+          </a:xfrm>
+          <a:prstGeom prst="rect">
+            <a:avLst/>
+          </a:prstGeom>
+        </p:spPr>
+      </p:pic>
+      <p:sp>
+        <p:nvSpPr>
+          <p:cNvPr id="8" name="Right Arrow 7">
+            <a:extLst>
+              <a:ext uri="{FF2B5EF4-FFF2-40B4-BE49-F238E27FC236}">
+                <a16:creationId xmlns:a16="http://schemas.microsoft.com/office/drawing/2014/main" id="{0E968A5B-2866-0DB2-F5D3-C410B4B668AD}"/>
+              </a:ext>
+            </a:extLst>
+          </p:cNvPr>
+          <p:cNvSpPr/>
+          <p:nvPr/>
+        </p:nvSpPr>
+        <p:spPr>
+          <a:xfrm>
+            <a:off x="3567659" y="4517540"/>
+            <a:ext cx="3013490" cy="1377662"/>
+          </a:xfrm>
+          <a:prstGeom prst="rightArrow">
+            <a:avLst/>
+          </a:prstGeom>
+          <a:ln>
+            <a:noFill/>
+          </a:ln>
+        </p:spPr>
+        <p:style>
+          <a:lnRef idx="2">
+            <a:schemeClr val="accent1">
+              <a:shade val="50000"/>
+            </a:schemeClr>
+          </a:lnRef>
+          <a:fillRef idx="1">
+            <a:schemeClr val="accent1"/>
+          </a:fillRef>
+          <a:effectRef idx="0">
+            <a:schemeClr val="accent1"/>
+          </a:effectRef>
+          <a:fontRef idx="minor">
+            <a:schemeClr val="lt1"/>
+          </a:fontRef>
+        </p:style>
+        <p:txBody>
+          <a:bodyPr rtlCol="0" anchor="ctr"/>
+          <a:lstStyle/>
+          <a:p>
+            <a:pPr algn="ctr"/>
+            <a:endParaRPr lang="en-US"/>
           </a:p>
         </p:txBody>
       </p:sp>
@@ -12642,74 +13429,36 @@
           <a:chExt cx="0" cy="0"/>
         </a:xfrm>
       </p:grpSpPr>
-      <p:sp>
-        <p:nvSpPr>
-          <p:cNvPr id="2" name="Title 1">
-            <a:extLst>
-              <a:ext uri="{FF2B5EF4-FFF2-40B4-BE49-F238E27FC236}">
-                <a16:creationId xmlns:a16="http://schemas.microsoft.com/office/drawing/2014/main" id="{002698E8-BED3-B270-B822-461B2FE35530}"/>
-              </a:ext>
-            </a:extLst>
-          </p:cNvPr>
-          <p:cNvSpPr>
-            <a:spLocks noGrp="1"/>
-          </p:cNvSpPr>
-          <p:nvPr>
-            <p:ph type="title"/>
-          </p:nvPr>
-        </p:nvSpPr>
-        <p:spPr>
-          <a:xfrm>
-            <a:off x="432000" y="647700"/>
-            <a:ext cx="5294430" cy="700114"/>
-          </a:xfrm>
-        </p:spPr>
-        <p:txBody>
-          <a:bodyPr/>
-          <a:lstStyle/>
-          <a:p>
-            <a:r>
-              <a:rPr lang="en-US" dirty="0"/>
-              <a:t>What is ATAR?</a:t>
-            </a:r>
-          </a:p>
-        </p:txBody>
-      </p:sp>
-      <p:sp>
-        <p:nvSpPr>
-          <p:cNvPr id="3" name="TextBox 2">
-            <a:extLst>
-              <a:ext uri="{FF2B5EF4-FFF2-40B4-BE49-F238E27FC236}">
-                <a16:creationId xmlns:a16="http://schemas.microsoft.com/office/drawing/2014/main" id="{D6F44F61-A750-60CB-3054-AC44141299C3}"/>
-              </a:ext>
-            </a:extLst>
-          </p:cNvPr>
-          <p:cNvSpPr txBox="1"/>
+      <p:pic>
+        <p:nvPicPr>
+          <p:cNvPr id="5" name="Picture 4" descr="Graphical user interface, text, application&#10;&#10;Description automatically generated">
+            <a:extLst>
+              <a:ext uri="{FF2B5EF4-FFF2-40B4-BE49-F238E27FC236}">
+                <a16:creationId xmlns:a16="http://schemas.microsoft.com/office/drawing/2014/main" id="{6C2834C2-03D2-BCF4-562A-F21FF2F3D933}"/>
+              </a:ext>
+            </a:extLst>
+          </p:cNvPr>
+          <p:cNvPicPr>
+            <a:picLocks noChangeAspect="1"/>
+          </p:cNvPicPr>
           <p:nvPr/>
-        </p:nvSpPr>
-        <p:spPr>
-          <a:xfrm>
-            <a:off x="4057650" y="2891790"/>
-            <a:ext cx="836896" cy="369332"/>
+        </p:nvPicPr>
+        <p:blipFill>
+          <a:blip r:embed="rId2"/>
+          <a:stretch>
+            <a:fillRect/>
+          </a:stretch>
+        </p:blipFill>
+        <p:spPr>
+          <a:xfrm>
+            <a:off x="2491292" y="0"/>
+            <a:ext cx="7209416" cy="6921039"/>
           </a:xfrm>
           <a:prstGeom prst="rect">
             <a:avLst/>
           </a:prstGeom>
-          <a:noFill/>
-        </p:spPr>
-        <p:txBody>
-          <a:bodyPr wrap="none" rtlCol="0">
-            <a:spAutoFit/>
-          </a:bodyPr>
-          <a:lstStyle/>
-          <a:p>
-            <a:r>
-              <a:rPr lang="en-US" dirty="0"/>
-              <a:t>Picture</a:t>
-            </a:r>
-          </a:p>
-        </p:txBody>
-      </p:sp>
+        </p:spPr>
+      </p:pic>
     </p:spTree>
     <p:extLst>
       <p:ext uri="{BB962C8B-B14F-4D97-AF65-F5344CB8AC3E}">
@@ -12740,117 +13489,46 @@
           <a:chExt cx="0" cy="0"/>
         </a:xfrm>
       </p:grpSpPr>
-      <p:sp>
-        <p:nvSpPr>
-          <p:cNvPr id="2" name="Title 1">
-            <a:extLst>
-              <a:ext uri="{FF2B5EF4-FFF2-40B4-BE49-F238E27FC236}">
-                <a16:creationId xmlns:a16="http://schemas.microsoft.com/office/drawing/2014/main" id="{EA90FB2A-C28A-15D1-F649-3D21C58708E9}"/>
-              </a:ext>
-            </a:extLst>
-          </p:cNvPr>
-          <p:cNvSpPr>
-            <a:spLocks noGrp="1"/>
-          </p:cNvSpPr>
-          <p:nvPr>
-            <p:ph type="title"/>
-          </p:nvPr>
-        </p:nvSpPr>
-        <p:spPr/>
-        <p:txBody>
-          <a:bodyPr/>
-          <a:lstStyle/>
-          <a:p>
-            <a:r>
-              <a:rPr lang="en-US" dirty="0"/>
-              <a:t>Our Project Structure: Keep it for me to talk</a:t>
-            </a:r>
-          </a:p>
-        </p:txBody>
-      </p:sp>
-      <p:sp>
-        <p:nvSpPr>
-          <p:cNvPr id="3" name="TextBox 2">
-            <a:extLst>
-              <a:ext uri="{FF2B5EF4-FFF2-40B4-BE49-F238E27FC236}">
-                <a16:creationId xmlns:a16="http://schemas.microsoft.com/office/drawing/2014/main" id="{345FCAE0-5048-0C22-9CCC-931C3DCAC3EE}"/>
-              </a:ext>
-            </a:extLst>
-          </p:cNvPr>
-          <p:cNvSpPr txBox="1"/>
+      <p:pic>
+        <p:nvPicPr>
+          <p:cNvPr id="4" name="Picture 3" descr="Graphical user interface&#10;&#10;Description automatically generated with low confidence">
+            <a:extLst>
+              <a:ext uri="{FF2B5EF4-FFF2-40B4-BE49-F238E27FC236}">
+                <a16:creationId xmlns:a16="http://schemas.microsoft.com/office/drawing/2014/main" id="{A0962BC2-F2EF-B76A-2DC0-0EBD1BC6D8F4}"/>
+              </a:ext>
+            </a:extLst>
+          </p:cNvPr>
+          <p:cNvPicPr>
+            <a:picLocks noChangeAspect="1"/>
+          </p:cNvPicPr>
           <p:nvPr/>
-        </p:nvSpPr>
-        <p:spPr>
-          <a:xfrm>
-            <a:off x="3503221" y="2196935"/>
-            <a:ext cx="6160661" cy="1477328"/>
+        </p:nvPicPr>
+        <p:blipFill>
+          <a:blip r:embed="rId2">
+            <a:extLst>
+              <a:ext uri="{837473B0-CC2E-450A-ABE3-18F120FF3D39}">
+                <a1611:picAttrSrcUrl xmlns:a1611="http://schemas.microsoft.com/office/drawing/2016/11/main" r:id="rId3"/>
+              </a:ext>
+            </a:extLst>
+          </a:blip>
+          <a:stretch>
+            <a:fillRect/>
+          </a:stretch>
+        </p:blipFill>
+        <p:spPr>
+          <a:xfrm>
+            <a:off x="976235" y="31647"/>
+            <a:ext cx="10239530" cy="6826353"/>
           </a:xfrm>
           <a:prstGeom prst="rect">
             <a:avLst/>
           </a:prstGeom>
-          <a:noFill/>
-        </p:spPr>
-        <p:txBody>
-          <a:bodyPr wrap="none" rtlCol="0">
-            <a:spAutoFit/>
-          </a:bodyPr>
-          <a:lstStyle/>
-          <a:p>
-            <a:pPr marL="285750" indent="-285750">
-              <a:buFont typeface="Arial" panose="020B0604020202020204" pitchFamily="34" charset="0"/>
-              <a:buChar char="•"/>
-            </a:pPr>
-            <a:r>
-              <a:rPr lang="en-US" dirty="0"/>
-              <a:t>Questions</a:t>
-            </a:r>
-          </a:p>
-          <a:p>
-            <a:pPr marL="742950" lvl="1" indent="-285750">
-              <a:buFont typeface="Arial" panose="020B0604020202020204" pitchFamily="34" charset="0"/>
-              <a:buChar char="•"/>
-            </a:pPr>
-            <a:r>
-              <a:rPr lang="en-US" dirty="0"/>
-              <a:t>We have focused on two main areas as Geolocation and  </a:t>
-            </a:r>
-          </a:p>
-          <a:p>
-            <a:pPr marL="285750" indent="-285750">
-              <a:buFont typeface="Arial" panose="020B0604020202020204" pitchFamily="34" charset="0"/>
-              <a:buChar char="•"/>
-            </a:pPr>
-            <a:r>
-              <a:rPr lang="en-US" dirty="0"/>
-              <a:t>Mensurating </a:t>
-            </a:r>
-          </a:p>
-          <a:p>
-            <a:pPr marL="285750" indent="-285750">
-              <a:buFont typeface="Arial" panose="020B0604020202020204" pitchFamily="34" charset="0"/>
-              <a:buChar char="•"/>
-            </a:pPr>
-            <a:r>
-              <a:rPr lang="en-US" dirty="0"/>
-              <a:t>Analysis</a:t>
-            </a:r>
-          </a:p>
-          <a:p>
-            <a:pPr marL="285750" indent="-285750">
-              <a:buFont typeface="Arial" panose="020B0604020202020204" pitchFamily="34" charset="0"/>
-              <a:buChar char="•"/>
-            </a:pPr>
-            <a:r>
-              <a:rPr lang="en-US" dirty="0"/>
-              <a:t>Conclusions</a:t>
-            </a:r>
-          </a:p>
-        </p:txBody>
-      </p:sp>
+        </p:spPr>
+      </p:pic>
     </p:spTree>
     <p:extLst>
       <p:ext uri="{BB962C8B-B14F-4D97-AF65-F5344CB8AC3E}">
-        <p14:creationId xmlns:p14="http://schemas.microsoft.com/office/powerpoint/2010/main" val="3471241879"/>
+        <p14:creationId xmlns:p14="http://schemas.microsoft.com/office/powerpoint/2010/main" val="3816807599"/>
       </p:ext>
     </p:extLst>
   </p:cSld>
@@ -12889,10 +13567,10 @@
       </p:grpSpPr>
       <p:sp>
         <p:nvSpPr>
-          <p:cNvPr id="9" name="Title 8">
-            <a:extLst>
-              <a:ext uri="{FF2B5EF4-FFF2-40B4-BE49-F238E27FC236}">
-                <a16:creationId xmlns:a16="http://schemas.microsoft.com/office/drawing/2014/main" id="{FEF304F5-32C5-4869-B185-859B567855A8}"/>
+          <p:cNvPr id="7" name="Text Placeholder 6">
+            <a:extLst>
+              <a:ext uri="{FF2B5EF4-FFF2-40B4-BE49-F238E27FC236}">
+                <a16:creationId xmlns:a16="http://schemas.microsoft.com/office/drawing/2014/main" id="{B21C28F5-3CA3-4B78-B5C9-550C00BB3174}"/>
               </a:ext>
             </a:extLst>
           </p:cNvPr>
@@ -12900,92 +13578,45 @@
             <a:spLocks noGrp="1"/>
           </p:cNvSpPr>
           <p:nvPr>
-            <p:ph type="title"/>
-          </p:nvPr>
-        </p:nvSpPr>
-        <p:spPr>
-          <a:xfrm>
-            <a:off x="6096000" y="496603"/>
-            <a:ext cx="4860290" cy="830997"/>
+            <p:ph type="body" sz="quarter" idx="12"/>
+          </p:nvPr>
+        </p:nvSpPr>
+        <p:spPr>
+          <a:xfrm>
+            <a:off x="420556" y="164892"/>
+            <a:ext cx="11121870" cy="6415789"/>
           </a:xfrm>
         </p:spPr>
         <p:txBody>
           <a:bodyPr rtlCol="0"/>
           <a:lstStyle/>
           <a:p>
-            <a:pPr rtl="0"/>
             <a:r>
-              <a:rPr lang="en-GB" sz="2800" dirty="0"/>
-              <a:t>Questions</a:t>
-            </a:r>
-          </a:p>
-        </p:txBody>
-      </p:sp>
-      <p:sp>
-        <p:nvSpPr>
-          <p:cNvPr id="7" name="Text Placeholder 6">
-            <a:extLst>
-              <a:ext uri="{FF2B5EF4-FFF2-40B4-BE49-F238E27FC236}">
-                <a16:creationId xmlns:a16="http://schemas.microsoft.com/office/drawing/2014/main" id="{B21C28F5-3CA3-4B78-B5C9-550C00BB3174}"/>
-              </a:ext>
-            </a:extLst>
-          </p:cNvPr>
-          <p:cNvSpPr>
-            <a:spLocks noGrp="1"/>
-          </p:cNvSpPr>
-          <p:nvPr>
-            <p:ph type="body" sz="quarter" idx="12"/>
-          </p:nvPr>
-        </p:nvSpPr>
-        <p:spPr>
-          <a:xfrm>
-            <a:off x="420557" y="120018"/>
-            <a:ext cx="5339930" cy="6355733"/>
-          </a:xfrm>
-        </p:spPr>
-        <p:txBody>
-          <a:bodyPr rtlCol="0"/>
-          <a:lstStyle/>
-          <a:p>
-            <a:pPr marL="0" indent="0" algn="l">
-              <a:buNone/>
-            </a:pPr>
-            <a:endParaRPr lang="en-AU" sz="2800" b="1" i="0" dirty="0">
-              <a:solidFill>
-                <a:srgbClr val="24292F"/>
-              </a:solidFill>
-              <a:effectLst/>
-              <a:latin typeface="-apple-system"/>
-            </a:endParaRPr>
-          </a:p>
-          <a:p>
-            <a:pPr algn="l"/>
-            <a:r>
-              <a:rPr lang="en-AU" dirty="0">
+              <a:rPr lang="en-AU" sz="3200" dirty="0">
                 <a:solidFill>
                   <a:srgbClr val="24292F"/>
                 </a:solidFill>
                 <a:latin typeface="-apple-system"/>
               </a:rPr>
-              <a:t>Is there a relationship with Geolocation and academic success?  </a:t>
+              <a:t>Is there a relationship with Geolocation academic success? </a:t>
             </a:r>
           </a:p>
           <a:p>
             <a:pPr lvl="1"/>
             <a:r>
-              <a:rPr lang="en-AU" dirty="0">
+              <a:rPr lang="en-AU" sz="3200" dirty="0">
                 <a:solidFill>
                   <a:srgbClr val="24292F"/>
                 </a:solidFill>
                 <a:latin typeface="-apple-system"/>
               </a:rPr>
-              <a:t>YES, Schools closer to Major Cities have better performance academically.</a:t>
+              <a:t>YES, Schools closer to Major Cities have better academic performance.</a:t>
             </a:r>
           </a:p>
           <a:p>
             <a:pPr algn="l"/>
             <a:r>
-              <a:rPr lang="en-AU" dirty="0">
+              <a:rPr lang="en-AU" sz="3200" dirty="0">
                 <a:solidFill>
                   <a:srgbClr val="24292F"/>
                 </a:solidFill>
@@ -12997,68 +13628,40 @@
           <a:p>
             <a:pPr lvl="1"/>
             <a:r>
-              <a:rPr lang="en-AU" dirty="0">
+              <a:rPr lang="en-AU" sz="3200" dirty="0">
                 <a:solidFill>
                   <a:srgbClr val="24292F"/>
                 </a:solidFill>
                 <a:latin typeface="-apple-system"/>
               </a:rPr>
-              <a:t>YES, There are more schools closer to Major Cities.</a:t>
+              <a:t>YES, There are more schools closer to Major Cities than regional Victoria</a:t>
             </a:r>
           </a:p>
           <a:p>
             <a:pPr algn="l"/>
             <a:r>
-              <a:rPr lang="en-AU" sz="1800" u="none" strike="noStrike" dirty="0">
+              <a:rPr lang="en-AU" sz="3200" b="0" i="0" dirty="0">
+                <a:solidFill>
+                  <a:srgbClr val="24292F"/>
+                </a:solidFill>
+                <a:effectLst/>
+                <a:latin typeface="-apple-system"/>
+              </a:rPr>
+              <a:t>Which school sector has their best academic success?</a:t>
+            </a:r>
+          </a:p>
+          <a:p>
+            <a:pPr lvl="1"/>
+            <a:r>
+              <a:rPr lang="en-AU" sz="3200" u="none" strike="noStrike" dirty="0">
                 <a:solidFill>
                   <a:srgbClr val="24292F"/>
                 </a:solidFill>
                 <a:latin typeface="-apple-system"/>
               </a:rPr>
-              <a:t>W</a:t>
+              <a:t>Non-Gov school sector had their best academic success.</a:t>
             </a:r>
-            <a:r>
-              <a:rPr lang="en-AU" sz="1800" b="0" i="0" u="none" strike="noStrike" dirty="0">
-                <a:solidFill>
-                  <a:srgbClr val="000000"/>
-                </a:solidFill>
-                <a:effectLst/>
-                <a:latin typeface="Arial" panose="020B0604020202020204" pitchFamily="34" charset="0"/>
-              </a:rPr>
-              <a:t>hich school </a:t>
-            </a:r>
-            <a:r>
-              <a:rPr lang="en-AU" sz="1800" dirty="0">
-                <a:solidFill>
-                  <a:srgbClr val="000000"/>
-                </a:solidFill>
-                <a:latin typeface="Arial" panose="020B0604020202020204" pitchFamily="34" charset="0"/>
-              </a:rPr>
-              <a:t>sector has best </a:t>
-            </a:r>
-            <a:r>
-              <a:rPr lang="en-AU" sz="1800" b="0" i="0" u="none" strike="noStrike" dirty="0">
-                <a:solidFill>
-                  <a:srgbClr val="000000"/>
-                </a:solidFill>
-                <a:effectLst/>
-                <a:latin typeface="Arial" panose="020B0604020202020204" pitchFamily="34" charset="0"/>
-              </a:rPr>
-              <a:t>chance of success?</a:t>
-            </a:r>
-          </a:p>
-          <a:p>
-            <a:pPr lvl="1"/>
-            <a:r>
-              <a:rPr lang="en-AU" sz="1800" dirty="0">
-                <a:solidFill>
-                  <a:srgbClr val="000000"/>
-                </a:solidFill>
-                <a:latin typeface="Arial" panose="020B0604020202020204" pitchFamily="34" charset="0"/>
-              </a:rPr>
-              <a:t>Non-Gov schools had best chances of academic success.</a:t>
-            </a:r>
-            <a:endParaRPr lang="en-AU" sz="1800" b="0" i="0" u="none" strike="noStrike" dirty="0">
+            <a:endParaRPr lang="en-AU" sz="3200" b="0" i="0" u="none" strike="noStrike" dirty="0">
               <a:solidFill>
                 <a:srgbClr val="000000"/>
               </a:solidFill>
@@ -13070,7 +13673,7 @@
             <a:pPr marL="0" indent="0" algn="l">
               <a:buNone/>
             </a:pPr>
-            <a:endParaRPr lang="en-AU" b="1" i="0" dirty="0">
+            <a:endParaRPr lang="en-AU" sz="4000" b="1" i="0" dirty="0">
               <a:solidFill>
                 <a:srgbClr val="24292F"/>
               </a:solidFill>
@@ -13086,36 +13689,6 @@
           </a:p>
         </p:txBody>
       </p:sp>
-      <p:pic>
-        <p:nvPicPr>
-          <p:cNvPr id="11" name="Picture Placeholder 10" descr="close up of building">
-            <a:extLst>
-              <a:ext uri="{FF2B5EF4-FFF2-40B4-BE49-F238E27FC236}">
-                <a16:creationId xmlns:a16="http://schemas.microsoft.com/office/drawing/2014/main" id="{1CE2008D-DBCE-465F-90DA-B28A4E525131}"/>
-              </a:ext>
-            </a:extLst>
-          </p:cNvPr>
-          <p:cNvPicPr>
-            <a:picLocks noGrp="1" noChangeAspect="1"/>
-          </p:cNvPicPr>
-          <p:nvPr>
-            <p:ph type="pic" sz="quarter" idx="10"/>
-          </p:nvPr>
-        </p:nvPicPr>
-        <p:blipFill>
-          <a:blip r:embed="rId3"/>
-          <a:srcRect l="15351" r="15351"/>
-          <a:stretch>
-            <a:fillRect/>
-          </a:stretch>
-        </p:blipFill>
-        <p:spPr>
-          <a:xfrm>
-            <a:off x="5915689" y="912101"/>
-            <a:ext cx="5855754" cy="5631571"/>
-          </a:xfrm>
-        </p:spPr>
-      </p:pic>
     </p:spTree>
     <p:extLst>
       <p:ext uri="{BB962C8B-B14F-4D97-AF65-F5344CB8AC3E}">
@@ -13179,7 +13752,7 @@
         </p:blipFill>
         <p:spPr>
           <a:xfrm>
-            <a:off x="1237" y="301083"/>
+            <a:off x="1237" y="316073"/>
             <a:ext cx="12192001" cy="6858000"/>
           </a:xfrm>
         </p:spPr>
@@ -13278,7 +13851,7 @@
               </a:spcAft>
             </a:pPr>
             <a:r>
-              <a:rPr lang="en-GB" dirty="0">
+              <a:rPr lang="en-GB" sz="8000" dirty="0">
                 <a:latin typeface="Calibri Light" panose="020F0302020204030204" pitchFamily="34" charset="0"/>
                 <a:ea typeface="+mn-ea"/>
                 <a:cs typeface="+mn-cs"/>
@@ -13286,14 +13859,14 @@
               <a:t>Data clean up process</a:t>
             </a:r>
             <a:br>
-              <a:rPr lang="en-GB" sz="2400" dirty="0">
+              <a:rPr lang="en-GB" sz="8000" dirty="0">
                 <a:latin typeface="Calibri Light" panose="020F0302020204030204" pitchFamily="34" charset="0"/>
                 <a:ea typeface="+mn-ea"/>
                 <a:cs typeface="+mn-cs"/>
               </a:rPr>
             </a:br>
             <a:br>
-              <a:rPr lang="en-GB" dirty="0">
+              <a:rPr lang="en-GB" sz="8000" dirty="0">
                 <a:latin typeface="Calibri Light" panose="020F0302020204030204" pitchFamily="34" charset="0"/>
                 <a:ea typeface="+mn-ea"/>
                 <a:cs typeface="+mn-cs"/>
@@ -14351,6 +14924,15 @@
 </file>
 
 <file path=customXml/item1.xml><?xml version="1.0" encoding="utf-8"?>
+<?mso-contentType ?>
+<FormTemplates xmlns="http://schemas.microsoft.com/sharepoint/v3/contenttype/forms">
+  <Display>DocumentLibraryForm</Display>
+  <Edit>DocumentLibraryForm</Edit>
+  <New>DocumentLibraryForm</New>
+</FormTemplates>
+</file>
+
+<file path=customXml/item2.xml><?xml version="1.0" encoding="utf-8"?>
 <ct:contentTypeSchema xmlns:ct="http://schemas.microsoft.com/office/2006/metadata/contentType" xmlns:ma="http://schemas.microsoft.com/office/2006/metadata/properties/metaAttributes" ct:_="" ma:_="" ma:contentTypeName="Document" ma:contentTypeID="0x01010079F111ED35F8CC479449609E8A0923A6" ma:contentTypeVersion="12" ma:contentTypeDescription="Create a new document." ma:contentTypeScope="" ma:versionID="426e97fa315356fffbdcd9876fe988c2">
   <xsd:schema xmlns:xsd="http://www.w3.org/2001/XMLSchema" xmlns:xs="http://www.w3.org/2001/XMLSchema" xmlns:p="http://schemas.microsoft.com/office/2006/metadata/properties" xmlns:ns2="71af3243-3dd4-4a8d-8c0d-dd76da1f02a5" xmlns:ns3="16c05727-aa75-4e4a-9b5f-8a80a1165891" targetNamespace="http://schemas.microsoft.com/office/2006/metadata/properties" ma:root="true" ma:fieldsID="14b8f0def80e6d70ce3def20c90759ae" ns2:_="" ns3:_="">
     <xsd:import namespace="71af3243-3dd4-4a8d-8c0d-dd76da1f02a5"/>
@@ -14571,15 +15153,6 @@
 </ct:contentTypeSchema>
 </file>
 
-<file path=customXml/item2.xml><?xml version="1.0" encoding="utf-8"?>
-<?mso-contentType ?>
-<FormTemplates xmlns="http://schemas.microsoft.com/sharepoint/v3/contenttype/forms">
-  <Display>DocumentLibraryForm</Display>
-  <Edit>DocumentLibraryForm</Edit>
-  <New>DocumentLibraryForm</New>
-</FormTemplates>
-</file>
-
 <file path=customXml/item3.xml><?xml version="1.0" encoding="utf-8"?>
 <p:properties xmlns:p="http://schemas.microsoft.com/office/2006/metadata/properties" xmlns:xsi="http://www.w3.org/2001/XMLSchema-instance" xmlns:pc="http://schemas.microsoft.com/office/infopath/2007/PartnerControls">
   <documentManagement>
@@ -14590,6 +15163,14 @@
 </file>
 
 <file path=customXml/itemProps1.xml><?xml version="1.0" encoding="utf-8"?>
+<ds:datastoreItem xmlns:ds="http://schemas.openxmlformats.org/officeDocument/2006/customXml" ds:itemID="{05D99ABA-76CE-4A8E-B5F0-C051B96628DE}">
+  <ds:schemaRefs>
+    <ds:schemaRef ds:uri="http://schemas.microsoft.com/sharepoint/v3/contenttype/forms"/>
+  </ds:schemaRefs>
+</ds:datastoreItem>
+</file>
+
+<file path=customXml/itemProps2.xml><?xml version="1.0" encoding="utf-8"?>
 <ds:datastoreItem xmlns:ds="http://schemas.openxmlformats.org/officeDocument/2006/customXml" ds:itemID="{B19EB750-A6DA-4BE8-B87B-FC499FE73360}">
   <ds:schemaRefs>
     <ds:schemaRef ds:uri="http://schemas.microsoft.com/office/2006/metadata/contentType"/>
@@ -14608,14 +15189,6 @@
 </ds:datastoreItem>
 </file>
 
-<file path=customXml/itemProps2.xml><?xml version="1.0" encoding="utf-8"?>
-<ds:datastoreItem xmlns:ds="http://schemas.openxmlformats.org/officeDocument/2006/customXml" ds:itemID="{05D99ABA-76CE-4A8E-B5F0-C051B96628DE}">
-  <ds:schemaRefs>
-    <ds:schemaRef ds:uri="http://schemas.microsoft.com/sharepoint/v3/contenttype/forms"/>
-  </ds:schemaRefs>
-</ds:datastoreItem>
-</file>
-
 <file path=customXml/itemProps3.xml><?xml version="1.0" encoding="utf-8"?>
 <ds:datastoreItem xmlns:ds="http://schemas.openxmlformats.org/officeDocument/2006/customXml" ds:itemID="{4DEA9014-ED64-4558-B1E1-D03F0EE32BEB}">
   <ds:schemaRefs>

</xml_diff>